<commit_message>
First full draft. No conclusion.
</commit_message>
<xml_diff>
--- a/Springer_UAV_book/Pictures/Fig7.pptx
+++ b/Springer_UAV_book/Pictures/Fig7.pptx
@@ -6,6 +6,7 @@
   </p:sldMasterIdLst>
   <p:sldIdLst>
     <p:sldId id="263" r:id="rId2"/>
+    <p:sldId id="264" r:id="rId3"/>
   </p:sldIdLst>
   <p:sldSz cx="9144000" cy="6858000" type="screen4x3"/>
   <p:notesSz cx="6858000" cy="9144000"/>
@@ -289,7 +290,7 @@
             <a:fld id="{1D8BD707-D9CF-40AE-B4C6-C98DA3205C09}" type="datetimeFigureOut">
               <a:rPr lang="en-US" smtClean="0"/>
               <a:pPr/>
-              <a:t>4/11/2012</a:t>
+              <a:t>4/14/2012</a:t>
             </a:fld>
             <a:endParaRPr lang="en-US"/>
           </a:p>
@@ -456,7 +457,7 @@
             <a:fld id="{1D8BD707-D9CF-40AE-B4C6-C98DA3205C09}" type="datetimeFigureOut">
               <a:rPr lang="en-US" smtClean="0"/>
               <a:pPr/>
-              <a:t>4/11/2012</a:t>
+              <a:t>4/14/2012</a:t>
             </a:fld>
             <a:endParaRPr lang="en-US"/>
           </a:p>
@@ -633,7 +634,7 @@
             <a:fld id="{1D8BD707-D9CF-40AE-B4C6-C98DA3205C09}" type="datetimeFigureOut">
               <a:rPr lang="en-US" smtClean="0"/>
               <a:pPr/>
-              <a:t>4/11/2012</a:t>
+              <a:t>4/14/2012</a:t>
             </a:fld>
             <a:endParaRPr lang="en-US"/>
           </a:p>
@@ -800,7 +801,7 @@
             <a:fld id="{1D8BD707-D9CF-40AE-B4C6-C98DA3205C09}" type="datetimeFigureOut">
               <a:rPr lang="en-US" smtClean="0"/>
               <a:pPr/>
-              <a:t>4/11/2012</a:t>
+              <a:t>4/14/2012</a:t>
             </a:fld>
             <a:endParaRPr lang="en-US"/>
           </a:p>
@@ -1043,7 +1044,7 @@
             <a:fld id="{1D8BD707-D9CF-40AE-B4C6-C98DA3205C09}" type="datetimeFigureOut">
               <a:rPr lang="en-US" smtClean="0"/>
               <a:pPr/>
-              <a:t>4/11/2012</a:t>
+              <a:t>4/14/2012</a:t>
             </a:fld>
             <a:endParaRPr lang="en-US"/>
           </a:p>
@@ -1328,7 +1329,7 @@
             <a:fld id="{1D8BD707-D9CF-40AE-B4C6-C98DA3205C09}" type="datetimeFigureOut">
               <a:rPr lang="en-US" smtClean="0"/>
               <a:pPr/>
-              <a:t>4/11/2012</a:t>
+              <a:t>4/14/2012</a:t>
             </a:fld>
             <a:endParaRPr lang="en-US"/>
           </a:p>
@@ -1747,7 +1748,7 @@
             <a:fld id="{1D8BD707-D9CF-40AE-B4C6-C98DA3205C09}" type="datetimeFigureOut">
               <a:rPr lang="en-US" smtClean="0"/>
               <a:pPr/>
-              <a:t>4/11/2012</a:t>
+              <a:t>4/14/2012</a:t>
             </a:fld>
             <a:endParaRPr lang="en-US"/>
           </a:p>
@@ -1862,7 +1863,7 @@
             <a:fld id="{1D8BD707-D9CF-40AE-B4C6-C98DA3205C09}" type="datetimeFigureOut">
               <a:rPr lang="en-US" smtClean="0"/>
               <a:pPr/>
-              <a:t>4/11/2012</a:t>
+              <a:t>4/14/2012</a:t>
             </a:fld>
             <a:endParaRPr lang="en-US"/>
           </a:p>
@@ -1954,7 +1955,7 @@
             <a:fld id="{1D8BD707-D9CF-40AE-B4C6-C98DA3205C09}" type="datetimeFigureOut">
               <a:rPr lang="en-US" smtClean="0"/>
               <a:pPr/>
-              <a:t>4/11/2012</a:t>
+              <a:t>4/14/2012</a:t>
             </a:fld>
             <a:endParaRPr lang="en-US"/>
           </a:p>
@@ -2228,7 +2229,7 @@
             <a:fld id="{1D8BD707-D9CF-40AE-B4C6-C98DA3205C09}" type="datetimeFigureOut">
               <a:rPr lang="en-US" smtClean="0"/>
               <a:pPr/>
-              <a:t>4/11/2012</a:t>
+              <a:t>4/14/2012</a:t>
             </a:fld>
             <a:endParaRPr lang="en-US"/>
           </a:p>
@@ -2478,7 +2479,7 @@
             <a:fld id="{1D8BD707-D9CF-40AE-B4C6-C98DA3205C09}" type="datetimeFigureOut">
               <a:rPr lang="en-US" smtClean="0"/>
               <a:pPr/>
-              <a:t>4/11/2012</a:t>
+              <a:t>4/14/2012</a:t>
             </a:fld>
             <a:endParaRPr lang="en-US"/>
           </a:p>
@@ -2688,7 +2689,7 @@
             <a:fld id="{1D8BD707-D9CF-40AE-B4C6-C98DA3205C09}" type="datetimeFigureOut">
               <a:rPr lang="en-US" smtClean="0"/>
               <a:pPr/>
-              <a:t>4/11/2012</a:t>
+              <a:t>4/14/2012</a:t>
             </a:fld>
             <a:endParaRPr lang="en-US"/>
           </a:p>
@@ -3871,6 +3872,766 @@
 </p:sld>
 </file>
 
+<file path=ppt/slides/slide2.xml><?xml version="1.0" encoding="utf-8"?>
+<p:sld xmlns:a="http://schemas.openxmlformats.org/drawingml/2006/main" xmlns:r="http://schemas.openxmlformats.org/officeDocument/2006/relationships" xmlns:p="http://schemas.openxmlformats.org/presentationml/2006/main">
+  <p:cSld>
+    <p:spTree>
+      <p:nvGrpSpPr>
+        <p:cNvPr id="1" name=""/>
+        <p:cNvGrpSpPr/>
+        <p:nvPr/>
+      </p:nvGrpSpPr>
+      <p:grpSpPr>
+        <a:xfrm>
+          <a:off x="0" y="0"/>
+          <a:ext cx="0" cy="0"/>
+          <a:chOff x="0" y="0"/>
+          <a:chExt cx="0" cy="0"/>
+        </a:xfrm>
+      </p:grpSpPr>
+      <p:pic>
+        <p:nvPicPr>
+          <p:cNvPr id="42004" name="Picture 20"/>
+          <p:cNvPicPr>
+            <a:picLocks noChangeAspect="1" noChangeArrowheads="1"/>
+          </p:cNvPicPr>
+          <p:nvPr/>
+        </p:nvPicPr>
+        <p:blipFill>
+          <a:blip r:embed="rId3" cstate="print"/>
+          <a:srcRect/>
+          <a:stretch>
+            <a:fillRect/>
+          </a:stretch>
+        </p:blipFill>
+        <p:spPr bwMode="auto">
+          <a:xfrm>
+            <a:off x="1106455" y="2715207"/>
+            <a:ext cx="2887852" cy="2683523"/>
+          </a:xfrm>
+          <a:prstGeom prst="rect">
+            <a:avLst/>
+          </a:prstGeom>
+          <a:noFill/>
+          <a:ln w="9525">
+            <a:noFill/>
+            <a:miter lim="800000"/>
+            <a:headEnd/>
+            <a:tailEnd/>
+          </a:ln>
+        </p:spPr>
+      </p:pic>
+      <p:sp>
+        <p:nvSpPr>
+          <p:cNvPr id="52" name="TextBox 51"/>
+          <p:cNvSpPr txBox="1"/>
+          <p:nvPr/>
+        </p:nvSpPr>
+        <p:spPr>
+          <a:xfrm>
+            <a:off x="2134475" y="1265459"/>
+            <a:ext cx="795337" cy="307777"/>
+          </a:xfrm>
+          <a:prstGeom prst="rect">
+            <a:avLst/>
+          </a:prstGeom>
+          <a:noFill/>
+        </p:spPr>
+        <p:txBody>
+          <a:bodyPr wrap="square" rtlCol="0">
+            <a:spAutoFit/>
+          </a:bodyPr>
+          <a:lstStyle/>
+          <a:p>
+            <a:r>
+              <a:rPr lang="en-US" sz="1400" b="1" dirty="0" smtClean="0">
+                <a:latin typeface="Garamond" pitchFamily="18" charset="0"/>
+              </a:rPr>
+              <a:t>North</a:t>
+            </a:r>
+            <a:endParaRPr lang="en-US" sz="1400" b="1" dirty="0">
+              <a:latin typeface="Garamond" pitchFamily="18" charset="0"/>
+            </a:endParaRPr>
+          </a:p>
+        </p:txBody>
+      </p:sp>
+      <p:sp>
+        <p:nvSpPr>
+          <p:cNvPr id="65" name="TextBox 64"/>
+          <p:cNvSpPr txBox="1"/>
+          <p:nvPr/>
+        </p:nvSpPr>
+        <p:spPr>
+          <a:xfrm>
+            <a:off x="1996750" y="3462238"/>
+            <a:ext cx="457201" cy="307777"/>
+          </a:xfrm>
+          <a:prstGeom prst="rect">
+            <a:avLst/>
+          </a:prstGeom>
+          <a:noFill/>
+        </p:spPr>
+        <p:txBody>
+          <a:bodyPr wrap="square" rtlCol="0">
+            <a:spAutoFit/>
+          </a:bodyPr>
+          <a:lstStyle/>
+          <a:p>
+            <a:r>
+              <a:rPr lang="en-US" sz="1400" b="1" dirty="0" smtClean="0">
+                <a:latin typeface="Garamond" pitchFamily="18" charset="0"/>
+              </a:rPr>
+              <a:t>CG</a:t>
+            </a:r>
+            <a:endParaRPr lang="en-US" sz="1400" b="1" dirty="0">
+              <a:latin typeface="Garamond" pitchFamily="18" charset="0"/>
+            </a:endParaRPr>
+          </a:p>
+        </p:txBody>
+      </p:sp>
+      <p:cxnSp>
+        <p:nvCxnSpPr>
+          <p:cNvPr id="77" name="Straight Arrow Connector 76"/>
+          <p:cNvCxnSpPr/>
+          <p:nvPr/>
+        </p:nvCxnSpPr>
+        <p:spPr>
+          <a:xfrm>
+            <a:off x="4390445" y="1949122"/>
+            <a:ext cx="704069" cy="308886"/>
+          </a:xfrm>
+          <a:prstGeom prst="straightConnector1">
+            <a:avLst/>
+          </a:prstGeom>
+          <a:ln w="25400">
+            <a:solidFill>
+              <a:schemeClr val="tx1"/>
+            </a:solidFill>
+            <a:tailEnd type="stealth" w="lg" len="med"/>
+          </a:ln>
+        </p:spPr>
+        <p:style>
+          <a:lnRef idx="1">
+            <a:schemeClr val="accent1"/>
+          </a:lnRef>
+          <a:fillRef idx="0">
+            <a:schemeClr val="accent1"/>
+          </a:fillRef>
+          <a:effectRef idx="0">
+            <a:schemeClr val="accent1"/>
+          </a:effectRef>
+          <a:fontRef idx="minor">
+            <a:schemeClr val="tx1"/>
+          </a:fontRef>
+        </p:style>
+      </p:cxnSp>
+      <p:cxnSp>
+        <p:nvCxnSpPr>
+          <p:cNvPr id="43" name="Straight Arrow Connector 42"/>
+          <p:cNvCxnSpPr>
+            <a:stCxn id="45" idx="4"/>
+          </p:cNvCxnSpPr>
+          <p:nvPr/>
+        </p:nvCxnSpPr>
+        <p:spPr>
+          <a:xfrm flipH="1" flipV="1">
+            <a:off x="2500604" y="1567543"/>
+            <a:ext cx="23247" cy="2205560"/>
+          </a:xfrm>
+          <a:prstGeom prst="straightConnector1">
+            <a:avLst/>
+          </a:prstGeom>
+          <a:ln w="25400">
+            <a:solidFill>
+              <a:schemeClr val="tx1"/>
+            </a:solidFill>
+            <a:tailEnd type="stealth" w="lg" len="med"/>
+          </a:ln>
+        </p:spPr>
+        <p:style>
+          <a:lnRef idx="1">
+            <a:schemeClr val="accent1"/>
+          </a:lnRef>
+          <a:fillRef idx="0">
+            <a:schemeClr val="accent1"/>
+          </a:fillRef>
+          <a:effectRef idx="0">
+            <a:schemeClr val="accent1"/>
+          </a:effectRef>
+          <a:fontRef idx="minor">
+            <a:schemeClr val="tx1"/>
+          </a:fontRef>
+        </p:style>
+      </p:cxnSp>
+      <p:sp>
+        <p:nvSpPr>
+          <p:cNvPr id="45" name="Flowchart: Or 44"/>
+          <p:cNvSpPr/>
+          <p:nvPr/>
+        </p:nvSpPr>
+        <p:spPr>
+          <a:xfrm rot="1299533">
+            <a:off x="2480013" y="3654685"/>
+            <a:ext cx="132980" cy="122751"/>
+          </a:xfrm>
+          <a:prstGeom prst="flowChartOr">
+            <a:avLst/>
+          </a:prstGeom>
+          <a:solidFill>
+            <a:schemeClr val="tx1"/>
+          </a:solidFill>
+          <a:ln w="15875">
+            <a:solidFill>
+              <a:schemeClr val="tx1"/>
+            </a:solidFill>
+            <a:tailEnd type="stealth" w="lg" len="med"/>
+          </a:ln>
+        </p:spPr>
+        <p:style>
+          <a:lnRef idx="1">
+            <a:schemeClr val="accent1"/>
+          </a:lnRef>
+          <a:fillRef idx="0">
+            <a:schemeClr val="accent1"/>
+          </a:fillRef>
+          <a:effectRef idx="0">
+            <a:schemeClr val="accent1"/>
+          </a:effectRef>
+          <a:fontRef idx="minor">
+            <a:schemeClr val="tx1"/>
+          </a:fontRef>
+        </p:style>
+        <p:txBody>
+          <a:bodyPr rtlCol="0" anchor="ctr"/>
+          <a:lstStyle/>
+          <a:p>
+            <a:pPr algn="ctr"/>
+            <a:endParaRPr lang="en-US">
+              <a:solidFill>
+                <a:schemeClr val="tx1"/>
+              </a:solidFill>
+            </a:endParaRPr>
+          </a:p>
+        </p:txBody>
+      </p:sp>
+      <p:cxnSp>
+        <p:nvCxnSpPr>
+          <p:cNvPr id="74" name="Straight Arrow Connector 73"/>
+          <p:cNvCxnSpPr>
+            <a:stCxn id="45" idx="0"/>
+          </p:cNvCxnSpPr>
+          <p:nvPr/>
+        </p:nvCxnSpPr>
+        <p:spPr>
+          <a:xfrm flipV="1">
+            <a:off x="2569155" y="1436914"/>
+            <a:ext cx="1013800" cy="2222104"/>
+          </a:xfrm>
+          <a:prstGeom prst="straightConnector1">
+            <a:avLst/>
+          </a:prstGeom>
+          <a:ln w="25400">
+            <a:solidFill>
+              <a:schemeClr val="tx1"/>
+            </a:solidFill>
+            <a:tailEnd type="stealth" w="lg" len="med"/>
+          </a:ln>
+        </p:spPr>
+        <p:style>
+          <a:lnRef idx="1">
+            <a:schemeClr val="accent1"/>
+          </a:lnRef>
+          <a:fillRef idx="0">
+            <a:schemeClr val="accent1"/>
+          </a:fillRef>
+          <a:effectRef idx="0">
+            <a:schemeClr val="accent1"/>
+          </a:effectRef>
+          <a:fontRef idx="minor">
+            <a:schemeClr val="tx1"/>
+          </a:fontRef>
+        </p:style>
+      </p:cxnSp>
+      <p:graphicFrame>
+        <p:nvGraphicFramePr>
+          <p:cNvPr id="79" name="Object 21"/>
+          <p:cNvGraphicFramePr>
+            <a:graphicFrameLocks noChangeAspect="1"/>
+          </p:cNvGraphicFramePr>
+          <p:nvPr/>
+        </p:nvGraphicFramePr>
+        <p:xfrm>
+          <a:off x="3257355" y="1138337"/>
+          <a:ext cx="307975" cy="422275"/>
+        </p:xfrm>
+        <a:graphic>
+          <a:graphicData uri="http://schemas.openxmlformats.org/presentationml/2006/ole">
+            <p:oleObj spid="_x0000_s55298" name="Equation" r:id="rId4" imgW="164880" imgH="228600" progId="Equation.DSMT4">
+              <p:embed/>
+            </p:oleObj>
+          </a:graphicData>
+        </a:graphic>
+      </p:graphicFrame>
+      <p:cxnSp>
+        <p:nvCxnSpPr>
+          <p:cNvPr id="80" name="Straight Arrow Connector 79"/>
+          <p:cNvCxnSpPr>
+            <a:stCxn id="45" idx="7"/>
+          </p:cNvCxnSpPr>
+          <p:nvPr/>
+        </p:nvCxnSpPr>
+        <p:spPr>
+          <a:xfrm flipV="1">
+            <a:off x="2606217" y="1940767"/>
+            <a:ext cx="1797832" cy="1752311"/>
+          </a:xfrm>
+          <a:prstGeom prst="straightConnector1">
+            <a:avLst/>
+          </a:prstGeom>
+          <a:ln w="25400">
+            <a:solidFill>
+              <a:schemeClr val="tx1"/>
+            </a:solidFill>
+            <a:tailEnd type="stealth" w="lg" len="med"/>
+          </a:ln>
+        </p:spPr>
+        <p:style>
+          <a:lnRef idx="1">
+            <a:schemeClr val="accent1"/>
+          </a:lnRef>
+          <a:fillRef idx="0">
+            <a:schemeClr val="accent1"/>
+          </a:fillRef>
+          <a:effectRef idx="0">
+            <a:schemeClr val="accent1"/>
+          </a:effectRef>
+          <a:fontRef idx="minor">
+            <a:schemeClr val="tx1"/>
+          </a:fontRef>
+        </p:style>
+      </p:cxnSp>
+      <p:graphicFrame>
+        <p:nvGraphicFramePr>
+          <p:cNvPr id="94" name="Object 21"/>
+          <p:cNvGraphicFramePr>
+            <a:graphicFrameLocks noChangeAspect="1"/>
+          </p:cNvGraphicFramePr>
+          <p:nvPr/>
+        </p:nvGraphicFramePr>
+        <p:xfrm>
+          <a:off x="4272223" y="1510881"/>
+          <a:ext cx="379413" cy="422275"/>
+        </p:xfrm>
+        <a:graphic>
+          <a:graphicData uri="http://schemas.openxmlformats.org/presentationml/2006/ole">
+            <p:oleObj spid="_x0000_s55299" name="Equation" r:id="rId5" imgW="203040" imgH="228600" progId="Equation.DSMT4">
+              <p:embed/>
+            </p:oleObj>
+          </a:graphicData>
+        </a:graphic>
+      </p:graphicFrame>
+      <p:graphicFrame>
+        <p:nvGraphicFramePr>
+          <p:cNvPr id="42005" name="Object 21"/>
+          <p:cNvGraphicFramePr>
+            <a:graphicFrameLocks noChangeAspect="1"/>
+          </p:cNvGraphicFramePr>
+          <p:nvPr/>
+        </p:nvGraphicFramePr>
+        <p:xfrm>
+          <a:off x="2112800" y="1589315"/>
+          <a:ext cx="307975" cy="422275"/>
+        </p:xfrm>
+        <a:graphic>
+          <a:graphicData uri="http://schemas.openxmlformats.org/presentationml/2006/ole">
+            <p:oleObj spid="_x0000_s55300" name="Equation" r:id="rId6" imgW="164880" imgH="228600" progId="Equation.DSMT4">
+              <p:embed/>
+            </p:oleObj>
+          </a:graphicData>
+        </a:graphic>
+      </p:graphicFrame>
+      <p:graphicFrame>
+        <p:nvGraphicFramePr>
+          <p:cNvPr id="117" name="Object 17"/>
+          <p:cNvGraphicFramePr>
+            <a:graphicFrameLocks noChangeAspect="1"/>
+          </p:cNvGraphicFramePr>
+          <p:nvPr/>
+        </p:nvGraphicFramePr>
+        <p:xfrm>
+          <a:off x="4977203" y="1797083"/>
+          <a:ext cx="403225" cy="422275"/>
+        </p:xfrm>
+        <a:graphic>
+          <a:graphicData uri="http://schemas.openxmlformats.org/presentationml/2006/ole">
+            <p:oleObj spid="_x0000_s55301" name="Equation" r:id="rId7" imgW="215640" imgH="228600" progId="Equation.DSMT4">
+              <p:embed/>
+            </p:oleObj>
+          </a:graphicData>
+        </a:graphic>
+      </p:graphicFrame>
+      <p:cxnSp>
+        <p:nvCxnSpPr>
+          <p:cNvPr id="119" name="Straight Arrow Connector 118"/>
+          <p:cNvCxnSpPr>
+            <a:stCxn id="45" idx="7"/>
+          </p:cNvCxnSpPr>
+          <p:nvPr/>
+        </p:nvCxnSpPr>
+        <p:spPr>
+          <a:xfrm flipV="1">
+            <a:off x="2606217" y="2267339"/>
+            <a:ext cx="2497628" cy="1425739"/>
+          </a:xfrm>
+          <a:prstGeom prst="straightConnector1">
+            <a:avLst/>
+          </a:prstGeom>
+          <a:ln w="25400">
+            <a:solidFill>
+              <a:schemeClr val="tx1"/>
+            </a:solidFill>
+            <a:tailEnd type="stealth" w="lg" len="med"/>
+          </a:ln>
+        </p:spPr>
+        <p:style>
+          <a:lnRef idx="1">
+            <a:schemeClr val="accent1"/>
+          </a:lnRef>
+          <a:fillRef idx="0">
+            <a:schemeClr val="accent1"/>
+          </a:fillRef>
+          <a:effectRef idx="0">
+            <a:schemeClr val="accent1"/>
+          </a:effectRef>
+          <a:fontRef idx="minor">
+            <a:schemeClr val="tx1"/>
+          </a:fontRef>
+        </p:style>
+      </p:cxnSp>
+      <p:graphicFrame>
+        <p:nvGraphicFramePr>
+          <p:cNvPr id="42007" name="Object 15"/>
+          <p:cNvGraphicFramePr>
+            <a:graphicFrameLocks noChangeAspect="1"/>
+          </p:cNvGraphicFramePr>
+          <p:nvPr/>
+        </p:nvGraphicFramePr>
+        <p:xfrm>
+          <a:off x="4845439" y="2435743"/>
+          <a:ext cx="379413" cy="446088"/>
+        </p:xfrm>
+        <a:graphic>
+          <a:graphicData uri="http://schemas.openxmlformats.org/presentationml/2006/ole">
+            <p:oleObj spid="_x0000_s55302" name="Equation" r:id="rId8" imgW="203040" imgH="241200" progId="Equation.DSMT4">
+              <p:embed/>
+            </p:oleObj>
+          </a:graphicData>
+        </a:graphic>
+      </p:graphicFrame>
+      <p:sp>
+        <p:nvSpPr>
+          <p:cNvPr id="122" name="Arc 121"/>
+          <p:cNvSpPr/>
+          <p:nvPr/>
+        </p:nvSpPr>
+        <p:spPr>
+          <a:xfrm rot="20079577">
+            <a:off x="727788" y="3536302"/>
+            <a:ext cx="4898571" cy="2015412"/>
+          </a:xfrm>
+          <a:prstGeom prst="arc">
+            <a:avLst>
+              <a:gd name="adj1" fmla="val 11111667"/>
+              <a:gd name="adj2" fmla="val 20574103"/>
+            </a:avLst>
+          </a:prstGeom>
+          <a:ln w="9525">
+            <a:solidFill>
+              <a:schemeClr val="tx1"/>
+            </a:solidFill>
+            <a:prstDash val="dash"/>
+            <a:tailEnd type="none" w="lg" len="med"/>
+          </a:ln>
+        </p:spPr>
+        <p:style>
+          <a:lnRef idx="1">
+            <a:schemeClr val="accent1"/>
+          </a:lnRef>
+          <a:fillRef idx="0">
+            <a:schemeClr val="accent1"/>
+          </a:fillRef>
+          <a:effectRef idx="0">
+            <a:schemeClr val="accent1"/>
+          </a:effectRef>
+          <a:fontRef idx="minor">
+            <a:schemeClr val="tx1"/>
+          </a:fontRef>
+        </p:style>
+        <p:txBody>
+          <a:bodyPr rtlCol="0" anchor="ctr"/>
+          <a:lstStyle/>
+          <a:p>
+            <a:pPr algn="ctr"/>
+            <a:endParaRPr lang="en-US"/>
+          </a:p>
+        </p:txBody>
+      </p:sp>
+      <p:sp>
+        <p:nvSpPr>
+          <p:cNvPr id="124" name="TextBox 123"/>
+          <p:cNvSpPr txBox="1"/>
+          <p:nvPr/>
+        </p:nvSpPr>
+        <p:spPr>
+          <a:xfrm>
+            <a:off x="744212" y="4269916"/>
+            <a:ext cx="795337" cy="523220"/>
+          </a:xfrm>
+          <a:prstGeom prst="rect">
+            <a:avLst/>
+          </a:prstGeom>
+          <a:noFill/>
+        </p:spPr>
+        <p:txBody>
+          <a:bodyPr wrap="square" rtlCol="0">
+            <a:spAutoFit/>
+          </a:bodyPr>
+          <a:lstStyle/>
+          <a:p>
+            <a:r>
+              <a:rPr lang="en-US" sz="1400" b="1" dirty="0" smtClean="0">
+                <a:latin typeface="Garamond" pitchFamily="18" charset="0"/>
+              </a:rPr>
+              <a:t>Ground track</a:t>
+            </a:r>
+            <a:endParaRPr lang="en-US" sz="1400" b="1" dirty="0">
+              <a:latin typeface="Garamond" pitchFamily="18" charset="0"/>
+            </a:endParaRPr>
+          </a:p>
+        </p:txBody>
+      </p:sp>
+      <p:sp>
+        <p:nvSpPr>
+          <p:cNvPr id="125" name="Arc 124"/>
+          <p:cNvSpPr/>
+          <p:nvPr/>
+        </p:nvSpPr>
+        <p:spPr>
+          <a:xfrm>
+            <a:off x="746451" y="2621924"/>
+            <a:ext cx="3107096" cy="2388636"/>
+          </a:xfrm>
+          <a:prstGeom prst="arc">
+            <a:avLst>
+              <a:gd name="adj1" fmla="val 18183383"/>
+              <a:gd name="adj2" fmla="val 19235365"/>
+            </a:avLst>
+          </a:prstGeom>
+          <a:ln w="15875">
+            <a:solidFill>
+              <a:schemeClr val="tx1"/>
+            </a:solidFill>
+            <a:prstDash val="solid"/>
+            <a:headEnd type="none"/>
+            <a:tailEnd type="stealth"/>
+          </a:ln>
+        </p:spPr>
+        <p:style>
+          <a:lnRef idx="1">
+            <a:schemeClr val="accent1"/>
+          </a:lnRef>
+          <a:fillRef idx="0">
+            <a:schemeClr val="accent1"/>
+          </a:fillRef>
+          <a:effectRef idx="0">
+            <a:schemeClr val="accent1"/>
+          </a:effectRef>
+          <a:fontRef idx="minor">
+            <a:schemeClr val="tx1"/>
+          </a:fontRef>
+        </p:style>
+        <p:txBody>
+          <a:bodyPr rtlCol="0" anchor="ctr"/>
+          <a:lstStyle/>
+          <a:p>
+            <a:pPr algn="ctr"/>
+            <a:endParaRPr lang="en-US"/>
+          </a:p>
+        </p:txBody>
+      </p:sp>
+      <p:graphicFrame>
+        <p:nvGraphicFramePr>
+          <p:cNvPr id="126" name="Object 19"/>
+          <p:cNvGraphicFramePr>
+            <a:graphicFrameLocks noChangeAspect="1"/>
+          </p:cNvGraphicFramePr>
+          <p:nvPr/>
+        </p:nvGraphicFramePr>
+        <p:xfrm>
+          <a:off x="3151253" y="2424502"/>
+          <a:ext cx="284162" cy="374650"/>
+        </p:xfrm>
+        <a:graphic>
+          <a:graphicData uri="http://schemas.openxmlformats.org/presentationml/2006/ole">
+            <p:oleObj spid="_x0000_s55303" name="Equation" r:id="rId9" imgW="152280" imgH="203040" progId="Equation.DSMT4">
+              <p:embed/>
+            </p:oleObj>
+          </a:graphicData>
+        </a:graphic>
+      </p:graphicFrame>
+      <p:sp>
+        <p:nvSpPr>
+          <p:cNvPr id="127" name="Arc 126"/>
+          <p:cNvSpPr/>
+          <p:nvPr/>
+        </p:nvSpPr>
+        <p:spPr>
+          <a:xfrm>
+            <a:off x="1380928" y="2653031"/>
+            <a:ext cx="2279787" cy="2208223"/>
+          </a:xfrm>
+          <a:prstGeom prst="arc">
+            <a:avLst>
+              <a:gd name="adj1" fmla="val 16214435"/>
+              <a:gd name="adj2" fmla="val 17677962"/>
+            </a:avLst>
+          </a:prstGeom>
+          <a:ln w="15875">
+            <a:solidFill>
+              <a:schemeClr val="tx1"/>
+            </a:solidFill>
+            <a:prstDash val="solid"/>
+            <a:headEnd type="none"/>
+            <a:tailEnd type="stealth"/>
+          </a:ln>
+        </p:spPr>
+        <p:style>
+          <a:lnRef idx="1">
+            <a:schemeClr val="accent1"/>
+          </a:lnRef>
+          <a:fillRef idx="0">
+            <a:schemeClr val="accent1"/>
+          </a:fillRef>
+          <a:effectRef idx="0">
+            <a:schemeClr val="accent1"/>
+          </a:effectRef>
+          <a:fontRef idx="minor">
+            <a:schemeClr val="tx1"/>
+          </a:fontRef>
+        </p:style>
+        <p:txBody>
+          <a:bodyPr rtlCol="0" anchor="ctr"/>
+          <a:lstStyle/>
+          <a:p>
+            <a:pPr algn="ctr"/>
+            <a:endParaRPr lang="en-US"/>
+          </a:p>
+        </p:txBody>
+      </p:sp>
+      <p:graphicFrame>
+        <p:nvGraphicFramePr>
+          <p:cNvPr id="42009" name="Object 25"/>
+          <p:cNvGraphicFramePr>
+            <a:graphicFrameLocks noChangeAspect="1"/>
+          </p:cNvGraphicFramePr>
+          <p:nvPr/>
+        </p:nvGraphicFramePr>
+        <p:xfrm>
+          <a:off x="2611016" y="2326465"/>
+          <a:ext cx="282575" cy="304800"/>
+        </p:xfrm>
+        <a:graphic>
+          <a:graphicData uri="http://schemas.openxmlformats.org/presentationml/2006/ole">
+            <p:oleObj spid="_x0000_s55304" name="Equation" r:id="rId10" imgW="152280" imgH="164880" progId="Equation.DSMT4">
+              <p:embed/>
+            </p:oleObj>
+          </a:graphicData>
+        </a:graphic>
+      </p:graphicFrame>
+      <p:sp>
+        <p:nvSpPr>
+          <p:cNvPr id="128" name="Arc 127"/>
+          <p:cNvSpPr/>
+          <p:nvPr/>
+        </p:nvSpPr>
+        <p:spPr>
+          <a:xfrm>
+            <a:off x="497626" y="2153598"/>
+            <a:ext cx="4009057" cy="3981442"/>
+          </a:xfrm>
+          <a:prstGeom prst="arc">
+            <a:avLst>
+              <a:gd name="adj1" fmla="val 16216377"/>
+              <a:gd name="adj2" fmla="val 19225362"/>
+            </a:avLst>
+          </a:prstGeom>
+          <a:ln w="15875">
+            <a:solidFill>
+              <a:schemeClr val="tx1"/>
+            </a:solidFill>
+            <a:prstDash val="solid"/>
+            <a:headEnd type="none"/>
+            <a:tailEnd type="stealth"/>
+          </a:ln>
+        </p:spPr>
+        <p:style>
+          <a:lnRef idx="1">
+            <a:schemeClr val="accent1"/>
+          </a:lnRef>
+          <a:fillRef idx="0">
+            <a:schemeClr val="accent1"/>
+          </a:fillRef>
+          <a:effectRef idx="0">
+            <a:schemeClr val="accent1"/>
+          </a:effectRef>
+          <a:fontRef idx="minor">
+            <a:schemeClr val="tx1"/>
+          </a:fontRef>
+        </p:style>
+        <p:txBody>
+          <a:bodyPr rtlCol="0" anchor="ctr"/>
+          <a:lstStyle/>
+          <a:p>
+            <a:pPr algn="ctr"/>
+            <a:endParaRPr lang="en-US"/>
+          </a:p>
+        </p:txBody>
+      </p:sp>
+      <p:graphicFrame>
+        <p:nvGraphicFramePr>
+          <p:cNvPr id="42010" name="Object 26"/>
+          <p:cNvGraphicFramePr>
+            <a:graphicFrameLocks noChangeAspect="1"/>
+          </p:cNvGraphicFramePr>
+          <p:nvPr/>
+        </p:nvGraphicFramePr>
+        <p:xfrm>
+          <a:off x="2670532" y="1852936"/>
+          <a:ext cx="282575" cy="304800"/>
+        </p:xfrm>
+        <a:graphic>
+          <a:graphicData uri="http://schemas.openxmlformats.org/presentationml/2006/ole">
+            <p:oleObj spid="_x0000_s55305" name="Equation" r:id="rId11" imgW="152280" imgH="164880" progId="Equation.DSMT4">
+              <p:embed/>
+            </p:oleObj>
+          </a:graphicData>
+        </a:graphic>
+      </p:graphicFrame>
+    </p:spTree>
+  </p:cSld>
+  <p:clrMapOvr>
+    <a:masterClrMapping/>
+  </p:clrMapOvr>
+  <p:timing>
+    <p:tnLst>
+      <p:par>
+        <p:cTn id="1" dur="indefinite" restart="never" nodeType="tmRoot"/>
+      </p:par>
+    </p:tnLst>
+  </p:timing>
+</p:sld>
+</file>
+
 <file path=ppt/theme/theme1.xml><?xml version="1.0" encoding="utf-8"?>
 <a:theme xmlns:a="http://schemas.openxmlformats.org/drawingml/2006/main" name="Office Theme">
   <a:themeElements>

</xml_diff>